<commit_message>
Fixing TFTW and DCOC
</commit_message>
<xml_diff>
--- a/WebContent/WEB-INF/templates/25th Anniversary/thoughtForTheWeek.pptx
+++ b/WebContent/WEB-INF/templates/25th Anniversary/thoughtForTheWeek.pptx
@@ -3572,35 +3572,6 @@
       </p:sp>
       <p:pic>
         <p:nvPicPr>
-          <p:cNvPr id="8" name="Picture 7"/>
-          <p:cNvPicPr>
-            <a:picLocks noChangeAspect="1"/>
-          </p:cNvPicPr>
-          <p:nvPr/>
-        </p:nvPicPr>
-        <p:blipFill rotWithShape="1">
-          <a:blip r:embed="rId2">
-            <a:extLst>
-              <a:ext uri="{28A0092B-C50C-407E-A947-70E740481C1C}">
-                <a14:useLocalDpi xmlns:a14="http://schemas.microsoft.com/office/drawing/2010/main" val="0"/>
-              </a:ext>
-            </a:extLst>
-          </a:blip>
-          <a:srcRect l="5103" t="12791" r="8163" b="6380"/>
-          <a:stretch/>
-        </p:blipFill>
-        <p:spPr>
-          <a:xfrm>
-            <a:off x="8079115" y="857250"/>
-            <a:ext cx="1041137" cy="1164733"/>
-          </a:xfrm>
-          <a:prstGeom prst="rect">
-            <a:avLst/>
-          </a:prstGeom>
-        </p:spPr>
-      </p:pic>
-      <p:pic>
-        <p:nvPicPr>
           <p:cNvPr id="9" name="Picture 8"/>
           <p:cNvPicPr>
             <a:picLocks noChangeAspect="1"/>
@@ -3608,7 +3579,7 @@
           <p:nvPr/>
         </p:nvPicPr>
         <p:blipFill>
-          <a:blip r:embed="rId3">
+          <a:blip r:embed="rId2">
             <a:extLst>
               <a:ext uri="{28A0092B-C50C-407E-A947-70E740481C1C}">
                 <a14:useLocalDpi xmlns:a14="http://schemas.microsoft.com/office/drawing/2010/main" val="0"/>
@@ -3672,6 +3643,30 @@
           </a:p>
         </p:txBody>
       </p:sp>
+      <p:pic>
+        <p:nvPicPr>
+          <p:cNvPr id="10" name="Picture 9"/>
+          <p:cNvPicPr>
+            <a:picLocks noChangeAspect="1"/>
+          </p:cNvPicPr>
+          <p:nvPr/>
+        </p:nvPicPr>
+        <p:blipFill>
+          <a:blip r:embed="rId3"/>
+          <a:stretch>
+            <a:fillRect/>
+          </a:stretch>
+        </p:blipFill>
+        <p:spPr>
+          <a:xfrm>
+            <a:off x="7726054" y="867467"/>
+            <a:ext cx="1417946" cy="1533539"/>
+          </a:xfrm>
+          <a:prstGeom prst="rect">
+            <a:avLst/>
+          </a:prstGeom>
+        </p:spPr>
+      </p:pic>
     </p:spTree>
     <p:extLst>
       <p:ext uri="{BB962C8B-B14F-4D97-AF65-F5344CB8AC3E}">

</xml_diff>